<commit_message>
Updated partially for extended tutorial.
</commit_message>
<xml_diff>
--- a/LaTeX/latex_intro.pptx
+++ b/LaTeX/latex_intro.pptx
@@ -11,7 +11,7 @@
     <p:sldMasterId id="2147483704" r:id="rId10"/>
   </p:sldMasterIdLst>
   <p:notesMasterIdLst>
-    <p:notesMasterId r:id="rId18"/>
+    <p:notesMasterId r:id="rId20"/>
   </p:notesMasterIdLst>
   <p:sldIdLst>
     <p:sldId id="257" r:id="rId11"/>
@@ -21,6 +21,8 @@
     <p:sldId id="262" r:id="rId15"/>
     <p:sldId id="263" r:id="rId16"/>
     <p:sldId id="261" r:id="rId17"/>
+    <p:sldId id="264" r:id="rId18"/>
+    <p:sldId id="265" r:id="rId19"/>
   </p:sldIdLst>
   <p:sldSz cx="9144000" cy="5143500" type="screen16x9"/>
   <p:notesSz cx="6858000" cy="9144000"/>
@@ -220,7 +222,7 @@
           <a:p>
             <a:fld id="{0CD2B5D8-C527-B44B-90D8-04AF11243266}" type="datetimeFigureOut">
               <a:rPr lang="en-US" smtClean="0"/>
-              <a:t>9/1/20</a:t>
+              <a:t>2/25/21</a:t>
             </a:fld>
             <a:endParaRPr lang="en-US"/>
           </a:p>
@@ -810,9 +812,9 @@
           <a:bodyPr/>
           <a:lstStyle/>
           <a:p>
-            <a:fld id="{27C394C1-9E96-0545-82FB-FF8A47974BC8}" type="datetime1">
+            <a:fld id="{E9AEF907-9F13-B04A-AA1B-35834381F21D}" type="datetime1">
               <a:rPr lang="en-US" smtClean="0"/>
-              <a:t>9/1/20</a:t>
+              <a:t>2/25/21</a:t>
             </a:fld>
             <a:endParaRPr lang="en-US"/>
           </a:p>
@@ -833,10 +835,7 @@
           <a:bodyPr/>
           <a:lstStyle/>
           <a:p>
-            <a:r>
-              <a:rPr lang="en-US"/>
-              <a:t>Fall AGU 2019</a:t>
-            </a:r>
+            <a:endParaRPr lang="en-US" dirty="0"/>
           </a:p>
         </p:txBody>
       </p:sp>
@@ -984,9 +983,9 @@
           <a:bodyPr/>
           <a:lstStyle/>
           <a:p>
-            <a:fld id="{E1EB604F-ADEC-2845-B651-A4D9DA86FE71}" type="datetime1">
+            <a:fld id="{786C05DC-9154-054F-87C7-A9FA43AB52FB}" type="datetime1">
               <a:rPr lang="en-US" smtClean="0"/>
-              <a:t>9/1/20</a:t>
+              <a:t>2/25/21</a:t>
             </a:fld>
             <a:endParaRPr lang="en-US"/>
           </a:p>
@@ -1007,10 +1006,7 @@
           <a:bodyPr/>
           <a:lstStyle/>
           <a:p>
-            <a:r>
-              <a:rPr lang="en-US"/>
-              <a:t>Fall AGU 2019</a:t>
-            </a:r>
+            <a:endParaRPr lang="en-US" dirty="0"/>
           </a:p>
         </p:txBody>
       </p:sp>
@@ -1119,9 +1115,9 @@
           <a:bodyPr/>
           <a:lstStyle/>
           <a:p>
-            <a:fld id="{8C2FFCE9-4605-B440-B781-C545FC649601}" type="datetime1">
+            <a:fld id="{17FC9E3C-8114-954F-B51A-156B7B5970B6}" type="datetime1">
               <a:rPr lang="en-US" smtClean="0"/>
-              <a:t>9/1/20</a:t>
+              <a:t>2/25/21</a:t>
             </a:fld>
             <a:endParaRPr lang="en-US"/>
           </a:p>
@@ -1142,10 +1138,7 @@
           <a:bodyPr/>
           <a:lstStyle/>
           <a:p>
-            <a:r>
-              <a:rPr lang="en-US"/>
-              <a:t>Fall AGU 2019</a:t>
-            </a:r>
+            <a:endParaRPr lang="en-US" dirty="0"/>
           </a:p>
         </p:txBody>
       </p:sp>
@@ -1367,9 +1360,9 @@
           <a:bodyPr/>
           <a:lstStyle/>
           <a:p>
-            <a:fld id="{6F51FF84-ED7B-C24F-9268-98C9F5F01421}" type="datetime1">
+            <a:fld id="{59F13C2E-2615-C74B-AFF8-BFD5777056D9}" type="datetime1">
               <a:rPr lang="en-US" smtClean="0"/>
-              <a:t>9/1/20</a:t>
+              <a:t>2/25/21</a:t>
             </a:fld>
             <a:endParaRPr lang="en-US"/>
           </a:p>
@@ -1396,10 +1389,7 @@
           <a:bodyPr/>
           <a:lstStyle/>
           <a:p>
-            <a:r>
-              <a:rPr lang="en-US"/>
-              <a:t>Fall AGU 2019</a:t>
-            </a:r>
+            <a:endParaRPr lang="en-US"/>
           </a:p>
         </p:txBody>
       </p:sp>
@@ -1580,9 +1570,9 @@
           <a:bodyPr/>
           <a:lstStyle/>
           <a:p>
-            <a:fld id="{0E053F4F-E380-314A-A73F-0D8795C7F41C}" type="datetime1">
+            <a:fld id="{107731E7-7291-9B41-A18F-43A885CE5CC0}" type="datetime1">
               <a:rPr lang="en-US" smtClean="0"/>
-              <a:t>9/1/20</a:t>
+              <a:t>2/25/21</a:t>
             </a:fld>
             <a:endParaRPr lang="en-US"/>
           </a:p>
@@ -1609,10 +1599,7 @@
           <a:bodyPr/>
           <a:lstStyle/>
           <a:p>
-            <a:r>
-              <a:rPr lang="en-US"/>
-              <a:t>Fall AGU 2019</a:t>
-            </a:r>
+            <a:endParaRPr lang="en-US"/>
           </a:p>
         </p:txBody>
       </p:sp>
@@ -1870,9 +1857,9 @@
           <a:bodyPr/>
           <a:lstStyle/>
           <a:p>
-            <a:fld id="{C5A411EA-BAE0-674E-B47B-5D3062936991}" type="datetime1">
+            <a:fld id="{A2C3699A-D3B1-C546-9F20-E09790F74450}" type="datetime1">
               <a:rPr lang="en-US" smtClean="0"/>
-              <a:t>9/1/20</a:t>
+              <a:t>2/25/21</a:t>
             </a:fld>
             <a:endParaRPr lang="en-US"/>
           </a:p>
@@ -1899,10 +1886,7 @@
           <a:bodyPr/>
           <a:lstStyle/>
           <a:p>
-            <a:r>
-              <a:rPr lang="en-US"/>
-              <a:t>Fall AGU 2019</a:t>
-            </a:r>
+            <a:endParaRPr lang="en-US"/>
           </a:p>
         </p:txBody>
       </p:sp>
@@ -2150,9 +2134,9 @@
           <a:bodyPr/>
           <a:lstStyle/>
           <a:p>
-            <a:fld id="{D03B62D6-1259-B241-B0D7-8778F59EC3A6}" type="datetime1">
+            <a:fld id="{B86E44F2-8AA5-8B46-80D7-18AB83B187A9}" type="datetime1">
               <a:rPr lang="en-US" smtClean="0"/>
-              <a:t>9/1/20</a:t>
+              <a:t>2/25/21</a:t>
             </a:fld>
             <a:endParaRPr lang="en-US"/>
           </a:p>
@@ -2179,10 +2163,7 @@
           <a:bodyPr/>
           <a:lstStyle/>
           <a:p>
-            <a:r>
-              <a:rPr lang="en-US"/>
-              <a:t>Fall AGU 2019</a:t>
-            </a:r>
+            <a:endParaRPr lang="en-US"/>
           </a:p>
         </p:txBody>
       </p:sp>
@@ -2577,9 +2558,9 @@
           <a:bodyPr/>
           <a:lstStyle/>
           <a:p>
-            <a:fld id="{1295C790-0965-8341-9489-3968FD68ADAF}" type="datetime1">
+            <a:fld id="{A68D4E59-D51B-9E43-B695-22F0AEC6D598}" type="datetime1">
               <a:rPr lang="en-US" smtClean="0"/>
-              <a:t>9/1/20</a:t>
+              <a:t>2/25/21</a:t>
             </a:fld>
             <a:endParaRPr lang="en-US"/>
           </a:p>
@@ -2606,10 +2587,7 @@
           <a:bodyPr/>
           <a:lstStyle/>
           <a:p>
-            <a:r>
-              <a:rPr lang="en-US"/>
-              <a:t>Fall AGU 2019</a:t>
-            </a:r>
+            <a:endParaRPr lang="en-US"/>
           </a:p>
         </p:txBody>
       </p:sp>
@@ -2733,9 +2711,9 @@
           <a:bodyPr/>
           <a:lstStyle/>
           <a:p>
-            <a:fld id="{05408062-F4BF-3A4E-89BB-395917DF940F}" type="datetime1">
+            <a:fld id="{E9575856-F621-3847-859A-FE950C64BF08}" type="datetime1">
               <a:rPr lang="en-US" smtClean="0"/>
-              <a:t>9/1/20</a:t>
+              <a:t>2/25/21</a:t>
             </a:fld>
             <a:endParaRPr lang="en-US"/>
           </a:p>
@@ -2762,10 +2740,7 @@
           <a:bodyPr/>
           <a:lstStyle/>
           <a:p>
-            <a:r>
-              <a:rPr lang="en-US"/>
-              <a:t>Fall AGU 2019</a:t>
-            </a:r>
+            <a:endParaRPr lang="en-US"/>
           </a:p>
         </p:txBody>
       </p:sp>
@@ -2861,9 +2836,9 @@
           <a:bodyPr/>
           <a:lstStyle/>
           <a:p>
-            <a:fld id="{9E444460-BA8C-5F4C-8A93-2DC2390C76E4}" type="datetime1">
+            <a:fld id="{AF9F013D-092E-1A4D-90D3-37A15AC949F6}" type="datetime1">
               <a:rPr lang="en-US" smtClean="0"/>
-              <a:t>9/1/20</a:t>
+              <a:t>2/25/21</a:t>
             </a:fld>
             <a:endParaRPr lang="en-US"/>
           </a:p>
@@ -2890,10 +2865,7 @@
           <a:bodyPr/>
           <a:lstStyle/>
           <a:p>
-            <a:r>
-              <a:rPr lang="en-US"/>
-              <a:t>Fall AGU 2019</a:t>
-            </a:r>
+            <a:endParaRPr lang="en-US"/>
           </a:p>
         </p:txBody>
       </p:sp>
@@ -3008,38 +2980,37 @@
           <a:p>
             <a:pPr lvl="0"/>
             <a:r>
-              <a:rPr lang="en-US"/>
+              <a:rPr lang="en-US" dirty="0"/>
               <a:t>Click to edit Master text styles</a:t>
             </a:r>
           </a:p>
           <a:p>
             <a:pPr lvl="1"/>
             <a:r>
-              <a:rPr lang="en-US"/>
+              <a:rPr lang="en-US" dirty="0"/>
               <a:t>Second level</a:t>
             </a:r>
           </a:p>
           <a:p>
             <a:pPr lvl="2"/>
             <a:r>
-              <a:rPr lang="en-US"/>
+              <a:rPr lang="en-US" dirty="0"/>
               <a:t>Third level</a:t>
             </a:r>
           </a:p>
           <a:p>
             <a:pPr lvl="3"/>
             <a:r>
-              <a:rPr lang="en-US"/>
+              <a:rPr lang="en-US" dirty="0"/>
               <a:t>Fourth level</a:t>
             </a:r>
           </a:p>
           <a:p>
             <a:pPr lvl="4"/>
             <a:r>
-              <a:rPr lang="en-US"/>
+              <a:rPr lang="en-US" dirty="0"/>
               <a:t>Fifth level</a:t>
             </a:r>
-            <a:endParaRPr lang="en-US" dirty="0"/>
           </a:p>
         </p:txBody>
       </p:sp>
@@ -3058,9 +3029,9 @@
           <a:bodyPr/>
           <a:lstStyle/>
           <a:p>
-            <a:fld id="{DB9FE6BF-6EE6-C143-87EF-13C50E014C98}" type="datetime1">
+            <a:fld id="{16C511B4-0406-4945-B72C-C8620661C230}" type="datetime1">
               <a:rPr lang="en-US" smtClean="0"/>
-              <a:t>9/1/20</a:t>
+              <a:t>2/25/21</a:t>
             </a:fld>
             <a:endParaRPr lang="en-US"/>
           </a:p>
@@ -3081,10 +3052,7 @@
           <a:bodyPr/>
           <a:lstStyle/>
           <a:p>
-            <a:r>
-              <a:rPr lang="en-US"/>
-              <a:t>Fall AGU 2019</a:t>
-            </a:r>
+            <a:endParaRPr lang="en-US" dirty="0"/>
           </a:p>
         </p:txBody>
       </p:sp>
@@ -3397,9 +3365,9 @@
           <a:bodyPr/>
           <a:lstStyle/>
           <a:p>
-            <a:fld id="{D61DA9CA-3BC9-B945-875A-0DF0468AEC98}" type="datetime1">
+            <a:fld id="{6756C46A-0C76-574B-B207-6B25FF762725}" type="datetime1">
               <a:rPr lang="en-US" smtClean="0"/>
-              <a:t>9/1/20</a:t>
+              <a:t>2/25/21</a:t>
             </a:fld>
             <a:endParaRPr lang="en-US"/>
           </a:p>
@@ -3426,10 +3394,7 @@
           <a:bodyPr/>
           <a:lstStyle/>
           <a:p>
-            <a:r>
-              <a:rPr lang="en-US"/>
-              <a:t>Fall AGU 2019</a:t>
-            </a:r>
+            <a:endParaRPr lang="en-US"/>
           </a:p>
         </p:txBody>
       </p:sp>
@@ -3700,9 +3665,9 @@
           <a:bodyPr/>
           <a:lstStyle/>
           <a:p>
-            <a:fld id="{1D2584C1-DDCB-3341-8F3D-11839459C04A}" type="datetime1">
+            <a:fld id="{E989F7D7-F907-2D4B-BDC3-FFCA764B4B31}" type="datetime1">
               <a:rPr lang="en-US" smtClean="0"/>
-              <a:t>9/1/20</a:t>
+              <a:t>2/25/21</a:t>
             </a:fld>
             <a:endParaRPr lang="en-US"/>
           </a:p>
@@ -3729,10 +3694,7 @@
           <a:bodyPr/>
           <a:lstStyle/>
           <a:p>
-            <a:r>
-              <a:rPr lang="en-US"/>
-              <a:t>Fall AGU 2019</a:t>
-            </a:r>
+            <a:endParaRPr lang="en-US"/>
           </a:p>
         </p:txBody>
       </p:sp>
@@ -3913,9 +3875,9 @@
           <a:bodyPr/>
           <a:lstStyle/>
           <a:p>
-            <a:fld id="{D5469781-EC02-8A43-B1CD-622E8D7B3BA6}" type="datetime1">
+            <a:fld id="{AA5928B5-90C4-B747-AD1F-27AD142351A5}" type="datetime1">
               <a:rPr lang="en-US" smtClean="0"/>
-              <a:t>9/1/20</a:t>
+              <a:t>2/25/21</a:t>
             </a:fld>
             <a:endParaRPr lang="en-US"/>
           </a:p>
@@ -3942,10 +3904,7 @@
           <a:bodyPr/>
           <a:lstStyle/>
           <a:p>
-            <a:r>
-              <a:rPr lang="en-US"/>
-              <a:t>Fall AGU 2019</a:t>
-            </a:r>
+            <a:endParaRPr lang="en-US"/>
           </a:p>
         </p:txBody>
       </p:sp>
@@ -4136,9 +4095,9 @@
           <a:bodyPr/>
           <a:lstStyle/>
           <a:p>
-            <a:fld id="{3EB79B58-5055-DF44-B963-86FC6F03F7B1}" type="datetime1">
+            <a:fld id="{06266EA9-4439-9B42-8EB0-2A9466A9FDE7}" type="datetime1">
               <a:rPr lang="en-US" smtClean="0"/>
-              <a:t>9/1/20</a:t>
+              <a:t>2/25/21</a:t>
             </a:fld>
             <a:endParaRPr lang="en-US"/>
           </a:p>
@@ -4165,10 +4124,7 @@
           <a:bodyPr/>
           <a:lstStyle/>
           <a:p>
-            <a:r>
-              <a:rPr lang="en-US"/>
-              <a:t>Fall AGU 2019</a:t>
-            </a:r>
+            <a:endParaRPr lang="en-US"/>
           </a:p>
         </p:txBody>
       </p:sp>
@@ -4470,7 +4426,7 @@
           <a:bodyPr/>
           <a:lstStyle/>
           <a:p>
-            <a:fld id="{B03ACA10-0C9A-3949-9D99-51531C995A93}" type="datetime1">
+            <a:fld id="{98FCF60D-EDEF-F742-8BE3-0EC0D04C847D}" type="datetime1">
               <a:rPr lang="en-US" smtClean="0">
                 <a:solidFill>
                   <a:srgbClr val="000000">
@@ -4478,7 +4434,7 @@
                   </a:srgbClr>
                 </a:solidFill>
               </a:rPr>
-              <a:t>9/1/20</a:t>
+              <a:t>2/25/21</a:t>
             </a:fld>
             <a:endParaRPr lang="en-US">
               <a:solidFill>
@@ -4505,16 +4461,13 @@
           <a:bodyPr/>
           <a:lstStyle/>
           <a:p>
-            <a:r>
-              <a:rPr lang="en-US">
-                <a:solidFill>
-                  <a:srgbClr val="000000">
-                    <a:tint val="75000"/>
-                  </a:srgbClr>
-                </a:solidFill>
-              </a:rPr>
-              <a:t>Fall AGU 2019</a:t>
-            </a:r>
+            <a:endParaRPr lang="en-US" dirty="0">
+              <a:solidFill>
+                <a:srgbClr val="000000">
+                  <a:tint val="75000"/>
+                </a:srgbClr>
+              </a:solidFill>
+            </a:endParaRPr>
           </a:p>
         </p:txBody>
       </p:sp>
@@ -4755,7 +4708,7 @@
           <a:bodyPr/>
           <a:lstStyle/>
           <a:p>
-            <a:fld id="{5059C93D-3385-6F4D-AF75-EC53DD80CE8D}" type="datetime1">
+            <a:fld id="{F14896C3-79F0-1741-900B-2688D9E9AA1E}" type="datetime1">
               <a:rPr lang="en-US" smtClean="0">
                 <a:solidFill>
                   <a:srgbClr val="000000">
@@ -4763,7 +4716,7 @@
                   </a:srgbClr>
                 </a:solidFill>
               </a:rPr>
-              <a:t>9/1/20</a:t>
+              <a:t>2/25/21</a:t>
             </a:fld>
             <a:endParaRPr lang="en-US">
               <a:solidFill>
@@ -4790,16 +4743,13 @@
           <a:bodyPr/>
           <a:lstStyle/>
           <a:p>
-            <a:r>
-              <a:rPr lang="en-US">
-                <a:solidFill>
-                  <a:srgbClr val="000000">
-                    <a:tint val="75000"/>
-                  </a:srgbClr>
-                </a:solidFill>
-              </a:rPr>
-              <a:t>Fall AGU 2019</a:t>
-            </a:r>
+            <a:endParaRPr lang="en-US" dirty="0">
+              <a:solidFill>
+                <a:srgbClr val="000000">
+                  <a:tint val="75000"/>
+                </a:srgbClr>
+              </a:solidFill>
+            </a:endParaRPr>
           </a:p>
         </p:txBody>
       </p:sp>
@@ -4942,7 +4892,7 @@
           <a:bodyPr/>
           <a:lstStyle/>
           <a:p>
-            <a:fld id="{FA564883-E38F-3D4F-86FA-CEE8FE4508BE}" type="datetime1">
+            <a:fld id="{DD8F6ACF-9C14-7742-97E6-C8EE398AD1D6}" type="datetime1">
               <a:rPr lang="en-US" smtClean="0">
                 <a:solidFill>
                   <a:srgbClr val="000000">
@@ -4950,7 +4900,7 @@
                   </a:srgbClr>
                 </a:solidFill>
               </a:rPr>
-              <a:t>9/1/20</a:t>
+              <a:t>2/25/21</a:t>
             </a:fld>
             <a:endParaRPr lang="en-US">
               <a:solidFill>
@@ -4977,16 +4927,13 @@
           <a:bodyPr/>
           <a:lstStyle/>
           <a:p>
-            <a:r>
-              <a:rPr lang="en-US">
-                <a:solidFill>
-                  <a:srgbClr val="000000">
-                    <a:tint val="75000"/>
-                  </a:srgbClr>
-                </a:solidFill>
-              </a:rPr>
-              <a:t>Fall AGU 2019</a:t>
-            </a:r>
+            <a:endParaRPr lang="en-US" dirty="0">
+              <a:solidFill>
+                <a:srgbClr val="000000">
+                  <a:tint val="75000"/>
+                </a:srgbClr>
+              </a:solidFill>
+            </a:endParaRPr>
           </a:p>
         </p:txBody>
       </p:sp>
@@ -5090,7 +5037,7 @@
           <a:bodyPr/>
           <a:lstStyle/>
           <a:p>
-            <a:fld id="{4D055194-D413-3643-94C7-67DBF96B05FB}" type="datetime1">
+            <a:fld id="{A5DE7518-37BE-AF46-A8A2-83E908CCE765}" type="datetime1">
               <a:rPr lang="en-US" smtClean="0">
                 <a:solidFill>
                   <a:srgbClr val="000000">
@@ -5098,7 +5045,7 @@
                   </a:srgbClr>
                 </a:solidFill>
               </a:rPr>
-              <a:t>9/1/20</a:t>
+              <a:t>2/25/21</a:t>
             </a:fld>
             <a:endParaRPr lang="en-US">
               <a:solidFill>
@@ -5125,16 +5072,13 @@
           <a:bodyPr/>
           <a:lstStyle/>
           <a:p>
-            <a:r>
-              <a:rPr lang="en-US">
-                <a:solidFill>
-                  <a:srgbClr val="000000">
-                    <a:tint val="75000"/>
-                  </a:srgbClr>
-                </a:solidFill>
-              </a:rPr>
-              <a:t>Fall AGU 2019</a:t>
-            </a:r>
+            <a:endParaRPr lang="en-US" dirty="0">
+              <a:solidFill>
+                <a:srgbClr val="000000">
+                  <a:tint val="75000"/>
+                </a:srgbClr>
+              </a:solidFill>
+            </a:endParaRPr>
           </a:p>
         </p:txBody>
       </p:sp>
@@ -5422,38 +5366,37 @@
           <a:p>
             <a:pPr lvl="0"/>
             <a:r>
-              <a:rPr lang="en-US"/>
+              <a:rPr lang="en-US" dirty="0"/>
               <a:t>Click to edit Master text styles</a:t>
             </a:r>
           </a:p>
           <a:p>
             <a:pPr lvl="1"/>
             <a:r>
-              <a:rPr lang="en-US"/>
+              <a:rPr lang="en-US" dirty="0"/>
               <a:t>Second level</a:t>
             </a:r>
           </a:p>
           <a:p>
             <a:pPr lvl="2"/>
             <a:r>
-              <a:rPr lang="en-US"/>
+              <a:rPr lang="en-US" dirty="0"/>
               <a:t>Third level</a:t>
             </a:r>
           </a:p>
           <a:p>
             <a:pPr lvl="3"/>
             <a:r>
-              <a:rPr lang="en-US"/>
+              <a:rPr lang="en-US" dirty="0"/>
               <a:t>Fourth level</a:t>
             </a:r>
           </a:p>
           <a:p>
             <a:pPr lvl="4"/>
             <a:r>
-              <a:rPr lang="en-US"/>
+              <a:rPr lang="en-US" dirty="0"/>
               <a:t>Fifth level</a:t>
             </a:r>
-            <a:endParaRPr lang="en-US" dirty="0"/>
           </a:p>
         </p:txBody>
       </p:sp>
@@ -5529,9 +5472,9 @@
           <a:bodyPr/>
           <a:lstStyle/>
           <a:p>
-            <a:fld id="{0E996A99-584A-354A-8BD0-085592F32902}" type="datetime1">
+            <a:fld id="{C6F4520A-B06E-C447-BE81-7546139B7999}" type="datetime1">
               <a:rPr lang="en-US" smtClean="0"/>
-              <a:t>9/1/20</a:t>
+              <a:t>2/25/21</a:t>
             </a:fld>
             <a:endParaRPr lang="en-US"/>
           </a:p>
@@ -5552,10 +5495,7 @@
           <a:bodyPr/>
           <a:lstStyle/>
           <a:p>
-            <a:r>
-              <a:rPr lang="en-US"/>
-              <a:t>Fall AGU 2019</a:t>
-            </a:r>
+            <a:endParaRPr lang="en-US" dirty="0"/>
           </a:p>
         </p:txBody>
       </p:sp>
@@ -5755,7 +5695,7 @@
           <a:bodyPr/>
           <a:lstStyle/>
           <a:p>
-            <a:fld id="{BE5AD988-CA16-0A4A-9599-2B42D0D5514C}" type="datetime1">
+            <a:fld id="{7BEFA423-B3D8-8B44-9263-3AEADCA26458}" type="datetime1">
               <a:rPr lang="en-US" smtClean="0">
                 <a:solidFill>
                   <a:srgbClr val="000000">
@@ -5763,7 +5703,7 @@
                   </a:srgbClr>
                 </a:solidFill>
               </a:rPr>
-              <a:t>9/1/20</a:t>
+              <a:t>2/25/21</a:t>
             </a:fld>
             <a:endParaRPr lang="en-US">
               <a:solidFill>
@@ -5790,16 +5730,13 @@
           <a:bodyPr/>
           <a:lstStyle/>
           <a:p>
-            <a:r>
-              <a:rPr lang="en-US">
-                <a:solidFill>
-                  <a:srgbClr val="000000">
-                    <a:tint val="75000"/>
-                  </a:srgbClr>
-                </a:solidFill>
-              </a:rPr>
-              <a:t>Fall AGU 2019</a:t>
-            </a:r>
+            <a:endParaRPr lang="en-US">
+              <a:solidFill>
+                <a:srgbClr val="000000">
+                  <a:tint val="75000"/>
+                </a:srgbClr>
+              </a:solidFill>
+            </a:endParaRPr>
           </a:p>
         </p:txBody>
       </p:sp>
@@ -6057,7 +5994,7 @@
           <a:bodyPr/>
           <a:lstStyle/>
           <a:p>
-            <a:fld id="{FF14F293-C398-1E4D-AF9F-82DC081724CC}" type="datetime1">
+            <a:fld id="{84708301-50C7-E148-905F-1CDC770976E9}" type="datetime1">
               <a:rPr lang="en-US" smtClean="0">
                 <a:solidFill>
                   <a:srgbClr val="000000">
@@ -6065,7 +6002,7 @@
                   </a:srgbClr>
                 </a:solidFill>
               </a:rPr>
-              <a:t>9/1/20</a:t>
+              <a:t>2/25/21</a:t>
             </a:fld>
             <a:endParaRPr lang="en-US">
               <a:solidFill>
@@ -6092,16 +6029,13 @@
           <a:bodyPr/>
           <a:lstStyle/>
           <a:p>
-            <a:r>
-              <a:rPr lang="en-US">
-                <a:solidFill>
-                  <a:srgbClr val="000000">
-                    <a:tint val="75000"/>
-                  </a:srgbClr>
-                </a:solidFill>
-              </a:rPr>
-              <a:t>Fall AGU 2019</a:t>
-            </a:r>
+            <a:endParaRPr lang="en-US">
+              <a:solidFill>
+                <a:srgbClr val="000000">
+                  <a:tint val="75000"/>
+                </a:srgbClr>
+              </a:solidFill>
+            </a:endParaRPr>
           </a:p>
         </p:txBody>
       </p:sp>
@@ -6261,7 +6195,7 @@
           <a:bodyPr/>
           <a:lstStyle/>
           <a:p>
-            <a:fld id="{83954ED7-EEA3-CE4D-84E7-ECB518EF3764}" type="datetime1">
+            <a:fld id="{35009B83-CD1A-B745-A52E-7EB6D4D21E81}" type="datetime1">
               <a:rPr lang="en-US" smtClean="0">
                 <a:solidFill>
                   <a:srgbClr val="000000">
@@ -6269,7 +6203,7 @@
                   </a:srgbClr>
                 </a:solidFill>
               </a:rPr>
-              <a:t>9/1/20</a:t>
+              <a:t>2/25/21</a:t>
             </a:fld>
             <a:endParaRPr lang="en-US">
               <a:solidFill>
@@ -6296,16 +6230,13 @@
           <a:bodyPr/>
           <a:lstStyle/>
           <a:p>
-            <a:r>
-              <a:rPr lang="en-US">
-                <a:solidFill>
-                  <a:srgbClr val="000000">
-                    <a:tint val="75000"/>
-                  </a:srgbClr>
-                </a:solidFill>
-              </a:rPr>
-              <a:t>Fall AGU 2019</a:t>
-            </a:r>
+            <a:endParaRPr lang="en-US">
+              <a:solidFill>
+                <a:srgbClr val="000000">
+                  <a:tint val="75000"/>
+                </a:srgbClr>
+              </a:solidFill>
+            </a:endParaRPr>
           </a:p>
         </p:txBody>
       </p:sp>
@@ -6426,7 +6357,7 @@
           <a:bodyPr/>
           <a:lstStyle/>
           <a:p>
-            <a:fld id="{B5095146-4CF1-7B4F-9156-FFCC0524A3F1}" type="datetime1">
+            <a:fld id="{44AF4850-A7D0-CB4A-A261-CEAF8A47DAE4}" type="datetime1">
               <a:rPr lang="en-US" smtClean="0">
                 <a:solidFill>
                   <a:srgbClr val="000000">
@@ -6434,7 +6365,7 @@
                   </a:srgbClr>
                 </a:solidFill>
               </a:rPr>
-              <a:t>9/1/20</a:t>
+              <a:t>2/25/21</a:t>
             </a:fld>
             <a:endParaRPr lang="en-US">
               <a:solidFill>
@@ -6461,16 +6392,13 @@
           <a:bodyPr/>
           <a:lstStyle/>
           <a:p>
-            <a:r>
-              <a:rPr lang="en-US">
-                <a:solidFill>
-                  <a:srgbClr val="000000">
-                    <a:tint val="75000"/>
-                  </a:srgbClr>
-                </a:solidFill>
-              </a:rPr>
-              <a:t>Fall AGU 2019</a:t>
-            </a:r>
+            <a:endParaRPr lang="en-US">
+              <a:solidFill>
+                <a:srgbClr val="000000">
+                  <a:tint val="75000"/>
+                </a:srgbClr>
+              </a:solidFill>
+            </a:endParaRPr>
           </a:p>
         </p:txBody>
       </p:sp>
@@ -6704,9 +6632,9 @@
           <a:bodyPr/>
           <a:lstStyle/>
           <a:p>
-            <a:fld id="{0C0E0E03-7FBB-3840-8F7D-08CE0B6BFF3B}" type="datetime1">
+            <a:fld id="{9D13288D-8649-D445-BEE2-B1C9F47D662E}" type="datetime1">
               <a:rPr lang="en-US" smtClean="0"/>
-              <a:t>9/1/20</a:t>
+              <a:t>2/25/21</a:t>
             </a:fld>
             <a:endParaRPr lang="en-US"/>
           </a:p>
@@ -6733,10 +6661,7 @@
           <a:bodyPr/>
           <a:lstStyle/>
           <a:p>
-            <a:r>
-              <a:rPr lang="en-US"/>
-              <a:t>Fall AGU 2019</a:t>
-            </a:r>
+            <a:endParaRPr lang="en-US"/>
           </a:p>
         </p:txBody>
       </p:sp>
@@ -6917,9 +6842,9 @@
           <a:bodyPr/>
           <a:lstStyle/>
           <a:p>
-            <a:fld id="{AD3978E5-1DAC-2E4C-9C6F-612474134ED4}" type="datetime1">
+            <a:fld id="{CE6732EC-AED9-F344-AEDF-E1C2BC1A51E3}" type="datetime1">
               <a:rPr lang="en-US" smtClean="0"/>
-              <a:t>9/1/20</a:t>
+              <a:t>2/25/21</a:t>
             </a:fld>
             <a:endParaRPr lang="en-US"/>
           </a:p>
@@ -6946,10 +6871,7 @@
           <a:bodyPr/>
           <a:lstStyle/>
           <a:p>
-            <a:r>
-              <a:rPr lang="en-US"/>
-              <a:t>Fall AGU 2019</a:t>
-            </a:r>
+            <a:endParaRPr lang="en-US"/>
           </a:p>
         </p:txBody>
       </p:sp>
@@ -7207,9 +7129,9 @@
           <a:bodyPr/>
           <a:lstStyle/>
           <a:p>
-            <a:fld id="{9C641902-5112-E848-9FA8-CE9D34DE9E3B}" type="datetime1">
+            <a:fld id="{082BE96E-F35A-DE4C-8CF9-3BD5DC6187F2}" type="datetime1">
               <a:rPr lang="en-US" smtClean="0"/>
-              <a:t>9/1/20</a:t>
+              <a:t>2/25/21</a:t>
             </a:fld>
             <a:endParaRPr lang="en-US"/>
           </a:p>
@@ -7236,10 +7158,7 @@
           <a:bodyPr/>
           <a:lstStyle/>
           <a:p>
-            <a:r>
-              <a:rPr lang="en-US"/>
-              <a:t>Fall AGU 2019</a:t>
-            </a:r>
+            <a:endParaRPr lang="en-US"/>
           </a:p>
         </p:txBody>
       </p:sp>
@@ -7487,9 +7406,9 @@
           <a:bodyPr/>
           <a:lstStyle/>
           <a:p>
-            <a:fld id="{E3206AA0-BFDF-0A45-8EE7-E1930F9C5A62}" type="datetime1">
+            <a:fld id="{5923D1FC-3963-DB42-A88D-4FD3C295A409}" type="datetime1">
               <a:rPr lang="en-US" smtClean="0"/>
-              <a:t>9/1/20</a:t>
+              <a:t>2/25/21</a:t>
             </a:fld>
             <a:endParaRPr lang="en-US"/>
           </a:p>
@@ -7516,10 +7435,7 @@
           <a:bodyPr/>
           <a:lstStyle/>
           <a:p>
-            <a:r>
-              <a:rPr lang="en-US"/>
-              <a:t>Fall AGU 2019</a:t>
-            </a:r>
+            <a:endParaRPr lang="en-US"/>
           </a:p>
         </p:txBody>
       </p:sp>
@@ -7914,9 +7830,9 @@
           <a:bodyPr/>
           <a:lstStyle/>
           <a:p>
-            <a:fld id="{E1A59A47-D4B8-1B45-BC53-D14CE5F0F434}" type="datetime1">
+            <a:fld id="{F1DBE553-91E6-3140-BA8B-D858379796E3}" type="datetime1">
               <a:rPr lang="en-US" smtClean="0"/>
-              <a:t>9/1/20</a:t>
+              <a:t>2/25/21</a:t>
             </a:fld>
             <a:endParaRPr lang="en-US"/>
           </a:p>
@@ -7943,10 +7859,7 @@
           <a:bodyPr/>
           <a:lstStyle/>
           <a:p>
-            <a:r>
-              <a:rPr lang="en-US"/>
-              <a:t>Fall AGU 2019</a:t>
-            </a:r>
+            <a:endParaRPr lang="en-US"/>
           </a:p>
         </p:txBody>
       </p:sp>
@@ -8070,9 +7983,9 @@
           <a:bodyPr/>
           <a:lstStyle/>
           <a:p>
-            <a:fld id="{DD14D7B7-95DB-AD45-9350-72FB0714B717}" type="datetime1">
+            <a:fld id="{49198940-2265-C64D-95BF-04E489D50109}" type="datetime1">
               <a:rPr lang="en-US" smtClean="0"/>
-              <a:t>9/1/20</a:t>
+              <a:t>2/25/21</a:t>
             </a:fld>
             <a:endParaRPr lang="en-US"/>
           </a:p>
@@ -8099,10 +8012,7 @@
           <a:bodyPr/>
           <a:lstStyle/>
           <a:p>
-            <a:r>
-              <a:rPr lang="en-US"/>
-              <a:t>Fall AGU 2019</a:t>
-            </a:r>
+            <a:endParaRPr lang="en-US"/>
           </a:p>
         </p:txBody>
       </p:sp>
@@ -8215,9 +8125,9 @@
           <a:bodyPr/>
           <a:lstStyle/>
           <a:p>
-            <a:fld id="{BE09342C-16E4-DE48-9F25-AFB9DC77E245}" type="datetime1">
+            <a:fld id="{03F4F094-11FD-5045-82D1-F4DB8CE77FEE}" type="datetime1">
               <a:rPr lang="en-US" smtClean="0"/>
-              <a:t>9/1/20</a:t>
+              <a:t>2/25/21</a:t>
             </a:fld>
             <a:endParaRPr lang="en-US"/>
           </a:p>
@@ -8238,10 +8148,7 @@
           <a:bodyPr/>
           <a:lstStyle/>
           <a:p>
-            <a:r>
-              <a:rPr lang="en-US"/>
-              <a:t>Fall AGU 2019</a:t>
-            </a:r>
+            <a:endParaRPr lang="en-US" dirty="0"/>
           </a:p>
         </p:txBody>
       </p:sp>
@@ -8356,9 +8263,9 @@
           <a:bodyPr/>
           <a:lstStyle/>
           <a:p>
-            <a:fld id="{F4AB981B-271D-BF48-BA0F-DC43E68F956D}" type="datetime1">
+            <a:fld id="{008E77EB-2DA9-4640-B3A2-3E0A450C6057}" type="datetime1">
               <a:rPr lang="en-US" smtClean="0"/>
-              <a:t>9/1/20</a:t>
+              <a:t>2/25/21</a:t>
             </a:fld>
             <a:endParaRPr lang="en-US"/>
           </a:p>
@@ -8385,10 +8292,7 @@
           <a:bodyPr/>
           <a:lstStyle/>
           <a:p>
-            <a:r>
-              <a:rPr lang="en-US"/>
-              <a:t>Fall AGU 2019</a:t>
-            </a:r>
+            <a:endParaRPr lang="en-US"/>
           </a:p>
         </p:txBody>
       </p:sp>
@@ -8682,9 +8586,9 @@
           <a:bodyPr/>
           <a:lstStyle/>
           <a:p>
-            <a:fld id="{7904857A-C25F-E141-A41E-F419CA41654C}" type="datetime1">
+            <a:fld id="{EA445906-D10F-DD4A-B683-594811D5F9DE}" type="datetime1">
               <a:rPr lang="en-US" smtClean="0"/>
-              <a:t>9/1/20</a:t>
+              <a:t>2/25/21</a:t>
             </a:fld>
             <a:endParaRPr lang="en-US"/>
           </a:p>
@@ -8711,10 +8615,7 @@
           <a:bodyPr/>
           <a:lstStyle/>
           <a:p>
-            <a:r>
-              <a:rPr lang="en-US"/>
-              <a:t>Fall AGU 2019</a:t>
-            </a:r>
+            <a:endParaRPr lang="en-US"/>
           </a:p>
         </p:txBody>
       </p:sp>
@@ -8985,9 +8886,9 @@
           <a:bodyPr/>
           <a:lstStyle/>
           <a:p>
-            <a:fld id="{2E401D94-181E-AE4A-B9F0-6496438CC7A5}" type="datetime1">
+            <a:fld id="{023DC88C-6D36-5841-8C6E-1E62250A81FB}" type="datetime1">
               <a:rPr lang="en-US" smtClean="0"/>
-              <a:t>9/1/20</a:t>
+              <a:t>2/25/21</a:t>
             </a:fld>
             <a:endParaRPr lang="en-US"/>
           </a:p>
@@ -9014,10 +8915,7 @@
           <a:bodyPr/>
           <a:lstStyle/>
           <a:p>
-            <a:r>
-              <a:rPr lang="en-US"/>
-              <a:t>Fall AGU 2019</a:t>
-            </a:r>
+            <a:endParaRPr lang="en-US"/>
           </a:p>
         </p:txBody>
       </p:sp>
@@ -9198,9 +9096,9 @@
           <a:bodyPr/>
           <a:lstStyle/>
           <a:p>
-            <a:fld id="{3185745A-3B00-7447-A3B6-71162A5AB426}" type="datetime1">
+            <a:fld id="{0B06ABED-B6F5-494E-BA0F-4C35411D247E}" type="datetime1">
               <a:rPr lang="en-US" smtClean="0"/>
-              <a:t>9/1/20</a:t>
+              <a:t>2/25/21</a:t>
             </a:fld>
             <a:endParaRPr lang="en-US"/>
           </a:p>
@@ -9227,10 +9125,7 @@
           <a:bodyPr/>
           <a:lstStyle/>
           <a:p>
-            <a:r>
-              <a:rPr lang="en-US"/>
-              <a:t>Fall AGU 2019</a:t>
-            </a:r>
+            <a:endParaRPr lang="en-US"/>
           </a:p>
         </p:txBody>
       </p:sp>
@@ -9421,9 +9316,9 @@
           <a:bodyPr/>
           <a:lstStyle/>
           <a:p>
-            <a:fld id="{E4177EBB-6BA0-C948-9E77-C2079493F9F1}" type="datetime1">
+            <a:fld id="{9B5A3B5A-FFDA-4E4D-8981-8550CFE747A5}" type="datetime1">
               <a:rPr lang="en-US" smtClean="0"/>
-              <a:t>9/1/20</a:t>
+              <a:t>2/25/21</a:t>
             </a:fld>
             <a:endParaRPr lang="en-US"/>
           </a:p>
@@ -9450,10 +9345,7 @@
           <a:bodyPr/>
           <a:lstStyle/>
           <a:p>
-            <a:r>
-              <a:rPr lang="en-US"/>
-              <a:t>Fall AGU 2019</a:t>
-            </a:r>
+            <a:endParaRPr lang="en-US"/>
           </a:p>
         </p:txBody>
       </p:sp>
@@ -9543,9 +9435,9 @@
           <a:bodyPr/>
           <a:lstStyle/>
           <a:p>
-            <a:fld id="{D956F635-DF1E-CD40-8899-A1D779E4091C}" type="datetime1">
+            <a:fld id="{45FD6411-2D98-7345-B530-DCFE8FBC8672}" type="datetime1">
               <a:rPr lang="en-US" smtClean="0"/>
-              <a:t>9/1/20</a:t>
+              <a:t>2/25/21</a:t>
             </a:fld>
             <a:endParaRPr lang="en-US"/>
           </a:p>
@@ -9566,10 +9458,7 @@
           <a:bodyPr/>
           <a:lstStyle/>
           <a:p>
-            <a:r>
-              <a:rPr lang="en-US"/>
-              <a:t>Fall AGU 2019</a:t>
-            </a:r>
+            <a:endParaRPr lang="en-US" dirty="0"/>
           </a:p>
         </p:txBody>
       </p:sp>
@@ -9910,9 +9799,9 @@
           <a:bodyPr/>
           <a:lstStyle/>
           <a:p>
-            <a:fld id="{ED278909-23B9-9C43-87FD-FBA370A80BF5}" type="datetimeFigureOut">
+            <a:fld id="{CE41D457-CEF8-2A4F-B3B3-7F7EC84286B6}" type="datetime1">
               <a:rPr lang="en-US" smtClean="0"/>
-              <a:t>9/1/20</a:t>
+              <a:t>2/25/21</a:t>
             </a:fld>
             <a:endParaRPr lang="en-US"/>
           </a:p>
@@ -10234,9 +10123,9 @@
           <a:bodyPr/>
           <a:lstStyle/>
           <a:p>
-            <a:fld id="{413F2D58-DEBD-AC46-B427-3F1E6995C368}" type="datetime1">
+            <a:fld id="{4F4A07C8-C018-D544-B57B-C6693BE466A8}" type="datetime1">
               <a:rPr lang="en-US" smtClean="0"/>
-              <a:t>9/1/20</a:t>
+              <a:t>2/25/21</a:t>
             </a:fld>
             <a:endParaRPr lang="en-US"/>
           </a:p>
@@ -10257,10 +10146,7 @@
           <a:bodyPr/>
           <a:lstStyle/>
           <a:p>
-            <a:r>
-              <a:rPr lang="en-US"/>
-              <a:t>Fall AGU 2019</a:t>
-            </a:r>
+            <a:endParaRPr lang="en-US" dirty="0"/>
           </a:p>
         </p:txBody>
       </p:sp>
@@ -10557,9 +10443,9 @@
             </a:lvl1pPr>
           </a:lstStyle>
           <a:p>
-            <a:fld id="{C6E93DB7-9BCA-C44C-AFD2-C684922CEAE2}" type="datetime1">
+            <a:fld id="{B62047A5-3342-0040-BF59-F67A7BC19430}" type="datetime1">
               <a:rPr lang="en-US" smtClean="0"/>
-              <a:t>9/1/20</a:t>
+              <a:t>2/25/21</a:t>
             </a:fld>
             <a:endParaRPr lang="en-US"/>
           </a:p>
@@ -10598,10 +10484,6 @@
             </a:lvl1pPr>
           </a:lstStyle>
           <a:p>
-            <a:r>
-              <a:rPr lang="en-US"/>
-              <a:t>Fall AGU 2019</a:t>
-            </a:r>
             <a:endParaRPr lang="en-US" dirty="0"/>
           </a:p>
         </p:txBody>
@@ -10711,7 +10593,7 @@
       </p:transition>
     </mc:Fallback>
   </mc:AlternateContent>
-  <p:hf hdr="0"/>
+  <p:hf sldNum="0" hdr="0" ftr="0" dt="0"/>
   <p:txStyles>
     <p:titleStyle>
       <a:lvl1pPr algn="l" defTabSz="685800" rtl="0" eaLnBrk="1" latinLnBrk="0" hangingPunct="1">
@@ -11168,9 +11050,9 @@
             </a:lvl1pPr>
           </a:lstStyle>
           <a:p>
-            <a:fld id="{9F13289E-8CB7-6D44-ABC4-10CC8A855208}" type="datetime1">
+            <a:fld id="{4823C1EE-D33E-E743-833E-3B67EE90E176}" type="datetime1">
               <a:rPr lang="en-US" smtClean="0"/>
-              <a:t>9/1/20</a:t>
+              <a:t>2/25/21</a:t>
             </a:fld>
             <a:endParaRPr lang="en-US"/>
           </a:p>
@@ -11209,10 +11091,6 @@
             </a:lvl1pPr>
           </a:lstStyle>
           <a:p>
-            <a:r>
-              <a:rPr lang="en-US"/>
-              <a:t>Fall AGU 2019</a:t>
-            </a:r>
             <a:endParaRPr lang="en-US" dirty="0"/>
           </a:p>
         </p:txBody>
@@ -11289,7 +11167,7 @@
       </p:transition>
     </mc:Fallback>
   </mc:AlternateContent>
-  <p:hf hdr="0"/>
+  <p:hf sldNum="0" hdr="0" ftr="0" dt="0"/>
   <p:txStyles>
     <p:titleStyle>
       <a:lvl1pPr algn="l" defTabSz="685800" rtl="0" eaLnBrk="1" latinLnBrk="0" hangingPunct="1">
@@ -11792,9 +11670,9 @@
             </a:lvl1pPr>
           </a:lstStyle>
           <a:p>
-            <a:fld id="{286BA855-294F-7344-B4C1-F30680D169A9}" type="datetime1">
+            <a:fld id="{D7E267D1-BE8D-574E-A9B5-A6394AABB320}" type="datetime1">
               <a:rPr lang="en-US" smtClean="0"/>
-              <a:t>9/1/20</a:t>
+              <a:t>2/25/21</a:t>
             </a:fld>
             <a:endParaRPr lang="en-US" dirty="0"/>
           </a:p>
@@ -11833,10 +11711,6 @@
             </a:lvl1pPr>
           </a:lstStyle>
           <a:p>
-            <a:r>
-              <a:rPr lang="en-US"/>
-              <a:t>Fall AGU 2019</a:t>
-            </a:r>
             <a:endParaRPr lang="en-US" dirty="0"/>
           </a:p>
         </p:txBody>
@@ -11916,7 +11790,7 @@
       </p:transition>
     </mc:Fallback>
   </mc:AlternateContent>
-  <p:hf hdr="0"/>
+  <p:hf sldNum="0" hdr="0" ftr="0" dt="0"/>
   <p:txStyles>
     <p:titleStyle>
       <a:lvl1pPr algn="l" defTabSz="685800" rtl="0" eaLnBrk="1" latinLnBrk="0" hangingPunct="1">
@@ -12389,9 +12263,9 @@
             </a:lvl1pPr>
           </a:lstStyle>
           <a:p>
-            <a:fld id="{16DEA471-6E71-824A-8746-511A75E1DE12}" type="datetime1">
+            <a:fld id="{7D9C5116-3BCF-F54A-B074-446C01838170}" type="datetime1">
               <a:rPr lang="en-US" smtClean="0"/>
-              <a:t>9/1/20</a:t>
+              <a:t>2/25/21</a:t>
             </a:fld>
             <a:endParaRPr lang="en-US"/>
           </a:p>
@@ -12436,10 +12310,7 @@
             </a:lvl1pPr>
           </a:lstStyle>
           <a:p>
-            <a:r>
-              <a:rPr lang="en-US"/>
-              <a:t>Fall AGU 2019</a:t>
-            </a:r>
+            <a:endParaRPr lang="en-US" dirty="0"/>
           </a:p>
         </p:txBody>
       </p:sp>
@@ -12523,7 +12394,7 @@
       </p:transition>
     </mc:Fallback>
   </mc:AlternateContent>
-  <p:hf hdr="0"/>
+  <p:hf sldNum="0" hdr="0" ftr="0" dt="0"/>
   <p:txStyles>
     <p:titleStyle>
       <a:lvl1pPr algn="l" defTabSz="685800" rtl="0" eaLnBrk="1" latinLnBrk="0" hangingPunct="1">
@@ -13030,7 +12901,7 @@
             </a:lvl1pPr>
           </a:lstStyle>
           <a:p>
-            <a:fld id="{F89129A2-2492-2D48-9053-2A4E82B58F8B}" type="datetime1">
+            <a:fld id="{D55816AC-72FF-B04B-AF47-5C9C82C073D5}" type="datetime1">
               <a:rPr lang="en-US" smtClean="0">
                 <a:solidFill>
                   <a:srgbClr val="000000">
@@ -13038,7 +12909,7 @@
                   </a:srgbClr>
                 </a:solidFill>
               </a:rPr>
-              <a:t>9/1/20</a:t>
+              <a:t>2/25/21</a:t>
             </a:fld>
             <a:endParaRPr lang="en-US">
               <a:solidFill>
@@ -13083,16 +12954,6 @@
             </a:lvl1pPr>
           </a:lstStyle>
           <a:p>
-            <a:r>
-              <a:rPr lang="en-US">
-                <a:solidFill>
-                  <a:srgbClr val="000000">
-                    <a:tint val="75000"/>
-                  </a:srgbClr>
-                </a:solidFill>
-              </a:rPr>
-              <a:t>Fall AGU 2019</a:t>
-            </a:r>
             <a:endParaRPr lang="en-US" dirty="0">
               <a:solidFill>
                 <a:srgbClr val="000000">
@@ -13208,7 +13069,7 @@
     <p:sldLayoutId id="2147483696" r:id="rId4"/>
     <p:sldLayoutId id="2147483697" r:id="rId5"/>
   </p:sldLayoutIdLst>
-  <p:hf hdr="0"/>
+  <p:hf sldNum="0" hdr="0" ftr="0" dt="0"/>
   <p:txStyles>
     <p:titleStyle>
       <a:lvl1pPr algn="l" defTabSz="685800" rtl="0" eaLnBrk="1" latinLnBrk="0" hangingPunct="1">
@@ -13733,7 +13594,7 @@
             </a:lvl1pPr>
           </a:lstStyle>
           <a:p>
-            <a:fld id="{6F2C5DE2-344D-BB43-AA40-F00224CAE469}" type="datetime1">
+            <a:fld id="{329E3464-C5B6-F24C-9C6D-D690FB6BDB53}" type="datetime1">
               <a:rPr lang="en-US" smtClean="0">
                 <a:solidFill>
                   <a:srgbClr val="000000">
@@ -13741,7 +13602,7 @@
                   </a:srgbClr>
                 </a:solidFill>
               </a:rPr>
-              <a:t>9/1/20</a:t>
+              <a:t>2/25/21</a:t>
             </a:fld>
             <a:endParaRPr lang="en-US" dirty="0">
               <a:solidFill>
@@ -13786,16 +13647,6 @@
             </a:lvl1pPr>
           </a:lstStyle>
           <a:p>
-            <a:r>
-              <a:rPr lang="en-US">
-                <a:solidFill>
-                  <a:srgbClr val="000000">
-                    <a:tint val="75000"/>
-                  </a:srgbClr>
-                </a:solidFill>
-              </a:rPr>
-              <a:t>Fall AGU 2019</a:t>
-            </a:r>
             <a:endParaRPr lang="en-US" dirty="0">
               <a:solidFill>
                 <a:srgbClr val="000000">
@@ -13893,7 +13744,7 @@
       </p:transition>
     </mc:Fallback>
   </mc:AlternateContent>
-  <p:hf hdr="0"/>
+  <p:hf sldNum="0" hdr="0" ftr="0" dt="0"/>
   <p:txStyles>
     <p:titleStyle>
       <a:lvl1pPr algn="l" defTabSz="685800" rtl="0" eaLnBrk="1" latinLnBrk="0" hangingPunct="1">
@@ -14366,9 +14217,9 @@
             </a:lvl1pPr>
           </a:lstStyle>
           <a:p>
-            <a:fld id="{5FE91DE0-6844-1247-992A-C91B2CA34FE8}" type="datetime1">
+            <a:fld id="{B1592037-4969-C542-B3B1-9FC481D61AD0}" type="datetime1">
               <a:rPr lang="en-US" smtClean="0"/>
-              <a:t>9/1/20</a:t>
+              <a:t>2/25/21</a:t>
             </a:fld>
             <a:endParaRPr lang="en-US"/>
           </a:p>
@@ -14413,10 +14264,7 @@
             </a:lvl1pPr>
           </a:lstStyle>
           <a:p>
-            <a:r>
-              <a:rPr lang="en-US"/>
-              <a:t>Fall AGU 2019</a:t>
-            </a:r>
+            <a:endParaRPr lang="en-US"/>
           </a:p>
         </p:txBody>
       </p:sp>
@@ -14500,7 +14348,7 @@
       </p:transition>
     </mc:Fallback>
   </mc:AlternateContent>
-  <p:hf hdr="0"/>
+  <p:hf sldNum="0" hdr="0" ftr="0" dt="0"/>
   <p:txStyles>
     <p:titleStyle>
       <a:lvl1pPr algn="l" defTabSz="685800" rtl="0" eaLnBrk="1" latinLnBrk="0" hangingPunct="1">
@@ -15911,7 +15759,7 @@
         </p:nvSpPr>
         <p:spPr>
           <a:xfrm>
-            <a:off x="85442" y="672100"/>
+            <a:off x="85442" y="695347"/>
             <a:ext cx="8986129" cy="4372597"/>
           </a:xfrm>
         </p:spPr>
@@ -15921,9 +15769,8 @@
           </a:bodyPr>
           <a:lstStyle/>
           <a:p>
-            <a:pPr marL="457200" indent="-457200">
-              <a:buFont typeface="Arial"/>
-              <a:buChar char="•"/>
+            <a:pPr marL="0" indent="0">
+              <a:buNone/>
             </a:pPr>
             <a:r>
               <a:rPr lang="en-US" sz="3200" dirty="0"/>
@@ -15931,9 +15778,8 @@
             </a:r>
           </a:p>
           <a:p>
-            <a:pPr marL="457200" indent="-457200">
-              <a:buFont typeface="Arial"/>
-              <a:buChar char="•"/>
+            <a:pPr marL="0" indent="0">
+              <a:buNone/>
             </a:pPr>
             <a:r>
               <a:rPr lang="en-US" sz="3200" dirty="0"/>
@@ -15941,19 +15787,33 @@
             </a:r>
           </a:p>
           <a:p>
-            <a:pPr marL="1371600" lvl="1">
-              <a:buFont typeface="Arial"/>
-              <a:buChar char="•"/>
+            <a:pPr marL="230188" lvl="1" indent="0">
+              <a:buNone/>
             </a:pPr>
             <a:r>
               <a:rPr lang="en-US" sz="2800" dirty="0"/>
-              <a:t>Python, MS Word, Google Docs, etc. all use Latex math formatting. </a:t>
-            </a:r>
-          </a:p>
-          <a:p>
-            <a:pPr marL="457200" indent="-457200">
-              <a:buFont typeface="Arial"/>
-              <a:buChar char="•"/>
+              <a:t>Python, MS Word, Google Docs, etc. all use L</a:t>
+            </a:r>
+            <a:r>
+              <a:rPr lang="en-US" sz="2800" baseline="30000" dirty="0"/>
+              <a:t>A</a:t>
+            </a:r>
+            <a:r>
+              <a:rPr lang="en-US" sz="2800" dirty="0"/>
+              <a:t>T</a:t>
+            </a:r>
+            <a:r>
+              <a:rPr lang="en-US" sz="2800" baseline="-25000" dirty="0"/>
+              <a:t>E</a:t>
+            </a:r>
+            <a:r>
+              <a:rPr lang="en-US" sz="2800" dirty="0"/>
+              <a:t>X math formatting. </a:t>
+            </a:r>
+          </a:p>
+          <a:p>
+            <a:pPr marL="0" indent="0">
+              <a:buNone/>
             </a:pPr>
             <a:r>
               <a:rPr lang="en-US" sz="3200" dirty="0"/>
@@ -15961,9 +15821,8 @@
             </a:r>
           </a:p>
           <a:p>
-            <a:pPr marL="1371600" lvl="1">
-              <a:buFont typeface="Arial"/>
-              <a:buChar char="•"/>
+            <a:pPr marL="1136650" lvl="1" indent="-906463">
+              <a:buNone/>
             </a:pPr>
             <a:r>
               <a:rPr lang="en-US" sz="2800" dirty="0" err="1"/>
@@ -15975,9 +15834,8 @@
             </a:r>
           </a:p>
           <a:p>
-            <a:pPr marL="457200" indent="-457200">
-              <a:buFont typeface="Arial"/>
-              <a:buChar char="•"/>
+            <a:pPr marL="0" indent="0">
+              <a:buNone/>
             </a:pPr>
             <a:r>
               <a:rPr lang="en-US" sz="3200" dirty="0"/>
@@ -15985,9 +15843,8 @@
             </a:r>
           </a:p>
           <a:p>
-            <a:pPr marL="1371600" lvl="1">
-              <a:buFont typeface="Arial"/>
-              <a:buChar char="•"/>
+            <a:pPr marL="1136650" lvl="1" indent="-906463">
+              <a:buNone/>
             </a:pPr>
             <a:r>
               <a:rPr lang="en-US" sz="2800" dirty="0"/>
@@ -15996,6 +15853,53 @@
           </a:p>
         </p:txBody>
       </p:sp>
+      <p:pic>
+        <p:nvPicPr>
+          <p:cNvPr id="4" name="Picture 10" descr="a meme illustrating how moving a picture in Microsoft Word messes up text">
+            <a:extLst>
+              <a:ext uri="{FF2B5EF4-FFF2-40B4-BE49-F238E27FC236}">
+                <a16:creationId xmlns:a16="http://schemas.microsoft.com/office/drawing/2014/main" id="{08CCCD72-F790-2A41-A8AB-005EED3DC0DA}"/>
+              </a:ext>
+            </a:extLst>
+          </p:cNvPr>
+          <p:cNvPicPr>
+            <a:picLocks noChangeAspect="1" noChangeArrowheads="1"/>
+          </p:cNvPicPr>
+          <p:nvPr/>
+        </p:nvPicPr>
+        <p:blipFill>
+          <a:blip r:embed="rId2">
+            <a:extLst>
+              <a:ext uri="{28A0092B-C50C-407E-A947-70E740481C1C}">
+                <a14:useLocalDpi xmlns:a14="http://schemas.microsoft.com/office/drawing/2010/main" val="0"/>
+              </a:ext>
+            </a:extLst>
+          </a:blip>
+          <a:srcRect/>
+          <a:stretch>
+            <a:fillRect/>
+          </a:stretch>
+        </p:blipFill>
+        <p:spPr bwMode="auto">
+          <a:xfrm>
+            <a:off x="2510725" y="1113161"/>
+            <a:ext cx="3649851" cy="1768484"/>
+          </a:xfrm>
+          <a:prstGeom prst="rect">
+            <a:avLst/>
+          </a:prstGeom>
+          <a:noFill/>
+          <a:extLst>
+            <a:ext uri="{909E8E84-426E-40DD-AFC4-6F175D3DCCD1}">
+              <a14:hiddenFill xmlns:a14="http://schemas.microsoft.com/office/drawing/2010/main">
+                <a:solidFill>
+                  <a:srgbClr val="FFFFFF"/>
+                </a:solidFill>
+              </a14:hiddenFill>
+            </a:ext>
+          </a:extLst>
+        </p:spPr>
+      </p:pic>
     </p:spTree>
     <p:extLst>
       <p:ext uri="{BB962C8B-B14F-4D97-AF65-F5344CB8AC3E}">
@@ -16055,7 +15959,7 @@
           <a:p>
             <a:r>
               <a:rPr lang="en-US" dirty="0"/>
-              <a:t>It is worth the effort.</a:t>
+              <a:t>It is often worth the effort.</a:t>
             </a:r>
           </a:p>
         </p:txBody>
@@ -16096,6 +16000,305 @@
     <p:extLst>
       <p:ext uri="{BB962C8B-B14F-4D97-AF65-F5344CB8AC3E}">
         <p14:creationId xmlns:p14="http://schemas.microsoft.com/office/powerpoint/2010/main" val="601662796"/>
+      </p:ext>
+    </p:extLst>
+  </p:cSld>
+  <p:clrMapOvr>
+    <a:masterClrMapping/>
+  </p:clrMapOvr>
+  <mc:AlternateContent xmlns:mc="http://schemas.openxmlformats.org/markup-compatibility/2006" xmlns:p14="http://schemas.microsoft.com/office/powerpoint/2010/main">
+    <mc:Choice Requires="p14">
+      <p:transition spd="med" p14:dur="700">
+        <p:fade/>
+      </p:transition>
+    </mc:Choice>
+    <mc:Fallback xmlns="">
+      <p:transition spd="med">
+        <p:fade/>
+      </p:transition>
+    </mc:Fallback>
+  </mc:AlternateContent>
+</p:sld>
+</file>
+
+<file path=ppt/slides/slide8.xml><?xml version="1.0" encoding="utf-8"?>
+<p:sld xmlns:a="http://schemas.openxmlformats.org/drawingml/2006/main" xmlns:r="http://schemas.openxmlformats.org/officeDocument/2006/relationships" xmlns:p="http://schemas.openxmlformats.org/presentationml/2006/main">
+  <p:cSld>
+    <p:spTree>
+      <p:nvGrpSpPr>
+        <p:cNvPr id="1" name=""/>
+        <p:cNvGrpSpPr/>
+        <p:nvPr/>
+      </p:nvGrpSpPr>
+      <p:grpSpPr>
+        <a:xfrm>
+          <a:off x="0" y="0"/>
+          <a:ext cx="0" cy="0"/>
+          <a:chOff x="0" y="0"/>
+          <a:chExt cx="0" cy="0"/>
+        </a:xfrm>
+      </p:grpSpPr>
+      <p:sp>
+        <p:nvSpPr>
+          <p:cNvPr id="2" name="Title 1">
+            <a:extLst>
+              <a:ext uri="{FF2B5EF4-FFF2-40B4-BE49-F238E27FC236}">
+                <a16:creationId xmlns:a16="http://schemas.microsoft.com/office/drawing/2014/main" id="{2F8D567F-6E20-0F42-B2D9-83EF506FA542}"/>
+              </a:ext>
+            </a:extLst>
+          </p:cNvPr>
+          <p:cNvSpPr>
+            <a:spLocks noGrp="1"/>
+          </p:cNvSpPr>
+          <p:nvPr>
+            <p:ph type="title"/>
+          </p:nvPr>
+        </p:nvSpPr>
+        <p:spPr/>
+        <p:txBody>
+          <a:bodyPr/>
+          <a:lstStyle/>
+          <a:p>
+            <a:r>
+              <a:rPr lang="en-US" dirty="0"/>
+              <a:t>Why </a:t>
+            </a:r>
+            <a:r>
+              <a:rPr lang="en-US" i="1" dirty="0"/>
+              <a:t>wouldn’t </a:t>
+            </a:r>
+            <a:r>
+              <a:rPr lang="en-US" dirty="0"/>
+              <a:t>I do this?</a:t>
+            </a:r>
+          </a:p>
+        </p:txBody>
+      </p:sp>
+      <p:sp>
+        <p:nvSpPr>
+          <p:cNvPr id="3" name="Content Placeholder 2">
+            <a:extLst>
+              <a:ext uri="{FF2B5EF4-FFF2-40B4-BE49-F238E27FC236}">
+                <a16:creationId xmlns:a16="http://schemas.microsoft.com/office/drawing/2014/main" id="{E7A5F2F9-BB49-254D-8104-A93CF58BC7B5}"/>
+              </a:ext>
+            </a:extLst>
+          </p:cNvPr>
+          <p:cNvSpPr>
+            <a:spLocks noGrp="1"/>
+          </p:cNvSpPr>
+          <p:nvPr>
+            <p:ph idx="1"/>
+          </p:nvPr>
+        </p:nvSpPr>
+        <p:spPr/>
+        <p:txBody>
+          <a:bodyPr/>
+          <a:lstStyle/>
+          <a:p>
+            <a:endParaRPr lang="en-US" dirty="0"/>
+          </a:p>
+        </p:txBody>
+      </p:sp>
+    </p:spTree>
+    <p:extLst>
+      <p:ext uri="{BB962C8B-B14F-4D97-AF65-F5344CB8AC3E}">
+        <p14:creationId xmlns:p14="http://schemas.microsoft.com/office/powerpoint/2010/main" val="2752583691"/>
+      </p:ext>
+    </p:extLst>
+  </p:cSld>
+  <p:clrMapOvr>
+    <a:masterClrMapping/>
+  </p:clrMapOvr>
+  <mc:AlternateContent xmlns:mc="http://schemas.openxmlformats.org/markup-compatibility/2006" xmlns:p14="http://schemas.microsoft.com/office/powerpoint/2010/main">
+    <mc:Choice Requires="p14">
+      <p:transition spd="med" p14:dur="700">
+        <p:fade/>
+      </p:transition>
+    </mc:Choice>
+    <mc:Fallback xmlns="">
+      <p:transition spd="med">
+        <p:fade/>
+      </p:transition>
+    </mc:Fallback>
+  </mc:AlternateContent>
+</p:sld>
+</file>
+
+<file path=ppt/slides/slide9.xml><?xml version="1.0" encoding="utf-8"?>
+<p:sld xmlns:a="http://schemas.openxmlformats.org/drawingml/2006/main" xmlns:r="http://schemas.openxmlformats.org/officeDocument/2006/relationships" xmlns:p="http://schemas.openxmlformats.org/presentationml/2006/main">
+  <p:cSld>
+    <p:spTree>
+      <p:nvGrpSpPr>
+        <p:cNvPr id="1" name=""/>
+        <p:cNvGrpSpPr/>
+        <p:nvPr/>
+      </p:nvGrpSpPr>
+      <p:grpSpPr>
+        <a:xfrm>
+          <a:off x="0" y="0"/>
+          <a:ext cx="0" cy="0"/>
+          <a:chOff x="0" y="0"/>
+          <a:chExt cx="0" cy="0"/>
+        </a:xfrm>
+      </p:grpSpPr>
+      <p:sp>
+        <p:nvSpPr>
+          <p:cNvPr id="2" name="Title 1">
+            <a:extLst>
+              <a:ext uri="{FF2B5EF4-FFF2-40B4-BE49-F238E27FC236}">
+                <a16:creationId xmlns:a16="http://schemas.microsoft.com/office/drawing/2014/main" id="{3D8ECFD7-15BF-D243-89B7-22068578F8D5}"/>
+              </a:ext>
+            </a:extLst>
+          </p:cNvPr>
+          <p:cNvSpPr>
+            <a:spLocks noGrp="1"/>
+          </p:cNvSpPr>
+          <p:nvPr>
+            <p:ph type="title"/>
+          </p:nvPr>
+        </p:nvSpPr>
+        <p:spPr/>
+        <p:txBody>
+          <a:bodyPr/>
+          <a:lstStyle/>
+          <a:p>
+            <a:r>
+              <a:rPr lang="en-US"/>
+              <a:t>Tips </a:t>
+            </a:r>
+            <a:r>
+              <a:rPr lang="en-US" dirty="0"/>
+              <a:t>Going Forward</a:t>
+            </a:r>
+          </a:p>
+        </p:txBody>
+      </p:sp>
+      <p:sp>
+        <p:nvSpPr>
+          <p:cNvPr id="3" name="Content Placeholder 2">
+            <a:extLst>
+              <a:ext uri="{FF2B5EF4-FFF2-40B4-BE49-F238E27FC236}">
+                <a16:creationId xmlns:a16="http://schemas.microsoft.com/office/drawing/2014/main" id="{DE7B754D-3DBA-4F47-9227-066E0E239CAE}"/>
+              </a:ext>
+            </a:extLst>
+          </p:cNvPr>
+          <p:cNvSpPr>
+            <a:spLocks noGrp="1"/>
+          </p:cNvSpPr>
+          <p:nvPr>
+            <p:ph idx="1"/>
+          </p:nvPr>
+        </p:nvSpPr>
+        <p:spPr>
+          <a:xfrm>
+            <a:off x="85442" y="672100"/>
+            <a:ext cx="8986129" cy="4471399"/>
+          </a:xfrm>
+        </p:spPr>
+        <p:txBody>
+          <a:bodyPr/>
+          <a:lstStyle/>
+          <a:p>
+            <a:pPr marL="0" indent="0">
+              <a:buNone/>
+            </a:pPr>
+            <a:r>
+              <a:rPr lang="en-US" dirty="0"/>
+              <a:t>Look for a template!</a:t>
+            </a:r>
+          </a:p>
+          <a:p>
+            <a:pPr lvl="1"/>
+            <a:r>
+              <a:rPr lang="en-US" dirty="0"/>
+              <a:t>Most scientific publications supply templates that match their style specifications &amp; save you all the work.</a:t>
+            </a:r>
+          </a:p>
+          <a:p>
+            <a:pPr lvl="1"/>
+            <a:r>
+              <a:rPr lang="en-US" dirty="0"/>
+              <a:t>Search the web for templates that you can customize.</a:t>
+            </a:r>
+          </a:p>
+          <a:p>
+            <a:pPr marL="0" indent="0">
+              <a:buNone/>
+            </a:pPr>
+            <a:r>
+              <a:rPr lang="en-US" dirty="0"/>
+              <a:t>Three letters to victory: G.D.S.</a:t>
+            </a:r>
+          </a:p>
+          <a:p>
+            <a:pPr lvl="1"/>
+            <a:r>
+              <a:rPr lang="en-US" dirty="0"/>
+              <a:t>Broad L</a:t>
+            </a:r>
+            <a:r>
+              <a:rPr lang="en-US" baseline="30000" dirty="0"/>
+              <a:t>A</a:t>
+            </a:r>
+            <a:r>
+              <a:rPr lang="en-US" dirty="0"/>
+              <a:t>T</a:t>
+            </a:r>
+            <a:r>
+              <a:rPr lang="en-US" baseline="-25000" dirty="0"/>
+              <a:t>E</a:t>
+            </a:r>
+            <a:r>
+              <a:rPr lang="en-US" dirty="0"/>
+              <a:t>X acceptance means solutions are on the web.</a:t>
+            </a:r>
+          </a:p>
+          <a:p>
+            <a:pPr marL="0" indent="0">
+              <a:buNone/>
+            </a:pPr>
+            <a:r>
+              <a:rPr lang="en-US" dirty="0"/>
+              <a:t>Start building your </a:t>
+            </a:r>
+            <a:r>
+              <a:rPr lang="en-US" dirty="0" err="1"/>
+              <a:t>BibTex</a:t>
+            </a:r>
+            <a:r>
+              <a:rPr lang="en-US" dirty="0"/>
+              <a:t> library NOW.</a:t>
+            </a:r>
+          </a:p>
+          <a:p>
+            <a:pPr lvl="1"/>
+            <a:r>
+              <a:rPr lang="en-US" dirty="0"/>
+              <a:t>Use a tool like Mendeley to automate this task.</a:t>
+            </a:r>
+          </a:p>
+          <a:p>
+            <a:pPr marL="0" indent="0">
+              <a:buNone/>
+            </a:pPr>
+            <a:r>
+              <a:rPr lang="en-US" dirty="0"/>
+              <a:t>It’s more than just papers.</a:t>
+            </a:r>
+          </a:p>
+          <a:p>
+            <a:pPr lvl="1"/>
+            <a:r>
+              <a:rPr lang="en-US" dirty="0"/>
+              <a:t>Presentations, posters, and more!</a:t>
+            </a:r>
+          </a:p>
+        </p:txBody>
+      </p:sp>
+    </p:spTree>
+    <p:extLst>
+      <p:ext uri="{BB962C8B-B14F-4D97-AF65-F5344CB8AC3E}">
+        <p14:creationId xmlns:p14="http://schemas.microsoft.com/office/powerpoint/2010/main" val="661802400"/>
       </p:ext>
     </p:extLst>
   </p:cSld>
@@ -18274,6 +18477,21 @@
 </file>
 
 <file path=customXml/item1.xml><?xml version="1.0" encoding="utf-8"?>
+<?mso-contentType ?>
+<FormTemplates xmlns="http://schemas.microsoft.com/sharepoint/v3/contenttype/forms">
+  <Display>DocumentLibraryForm</Display>
+  <Edit>DocumentLibraryForm</Edit>
+  <New>DocumentLibraryForm</New>
+</FormTemplates>
+</file>
+
+<file path=customXml/item2.xml><?xml version="1.0" encoding="utf-8"?>
+<p:properties xmlns:p="http://schemas.microsoft.com/office/2006/metadata/properties" xmlns:xsi="http://www.w3.org/2001/XMLSchema-instance" xmlns:pc="http://schemas.microsoft.com/office/infopath/2007/PartnerControls">
+  <documentManagement/>
+</p:properties>
+</file>
+
+<file path=customXml/item3.xml><?xml version="1.0" encoding="utf-8"?>
 <ct:contentTypeSchema xmlns:ct="http://schemas.microsoft.com/office/2006/metadata/contentType" xmlns:ma="http://schemas.microsoft.com/office/2006/metadata/properties/metaAttributes" ct:_="" ma:_="" ma:contentTypeName="Document" ma:contentTypeID="0x010100001D250500AAC24081650509B1BD893A" ma:contentTypeVersion="13" ma:contentTypeDescription="Create a new document." ma:contentTypeScope="" ma:versionID="77b52d254c0453e3cb59905bad3f97e4">
   <xsd:schema xmlns:xsd="http://www.w3.org/2001/XMLSchema" xmlns:xs="http://www.w3.org/2001/XMLSchema" xmlns:p="http://schemas.microsoft.com/office/2006/metadata/properties" xmlns:ns3="864850fb-1ad7-4a8a-9240-3621ba562e08" xmlns:ns4="2b4c7765-920b-4914-9761-ea3d972a99ef" targetNamespace="http://schemas.microsoft.com/office/2006/metadata/properties" ma:root="true" ma:fieldsID="749648e920e4eca04644c23af6d789f6" ns3:_="" ns4:_="">
     <xsd:import namespace="864850fb-1ad7-4a8a-9240-3621ba562e08"/>
@@ -18496,22 +18714,24 @@
 </ct:contentTypeSchema>
 </file>
 
-<file path=customXml/item2.xml><?xml version="1.0" encoding="utf-8"?>
-<p:properties xmlns:p="http://schemas.microsoft.com/office/2006/metadata/properties" xmlns:xsi="http://www.w3.org/2001/XMLSchema-instance" xmlns:pc="http://schemas.microsoft.com/office/infopath/2007/PartnerControls">
-  <documentManagement/>
-</p:properties>
+<file path=customXml/itemProps1.xml><?xml version="1.0" encoding="utf-8"?>
+<ds:datastoreItem xmlns:ds="http://schemas.openxmlformats.org/officeDocument/2006/customXml" ds:itemID="{B1E2B90F-30CB-4456-9AFB-EEA28731CD54}">
+  <ds:schemaRefs>
+    <ds:schemaRef ds:uri="http://schemas.microsoft.com/sharepoint/v3/contenttype/forms"/>
+  </ds:schemaRefs>
+</ds:datastoreItem>
 </file>
 
-<file path=customXml/item3.xml><?xml version="1.0" encoding="utf-8"?>
-<?mso-contentType ?>
-<FormTemplates xmlns="http://schemas.microsoft.com/sharepoint/v3/contenttype/forms">
-  <Display>DocumentLibraryForm</Display>
-  <Edit>DocumentLibraryForm</Edit>
-  <New>DocumentLibraryForm</New>
-</FormTemplates>
+<file path=customXml/itemProps2.xml><?xml version="1.0" encoding="utf-8"?>
+<ds:datastoreItem xmlns:ds="http://schemas.openxmlformats.org/officeDocument/2006/customXml" ds:itemID="{B0A916DD-11CA-458F-B8F7-4B7CD3BC2FF5}">
+  <ds:schemaRefs>
+    <ds:schemaRef ds:uri="http://schemas.microsoft.com/office/2006/metadata/properties"/>
+    <ds:schemaRef ds:uri="http://schemas.microsoft.com/office/infopath/2007/PartnerControls"/>
+  </ds:schemaRefs>
+</ds:datastoreItem>
 </file>
 
-<file path=customXml/itemProps1.xml><?xml version="1.0" encoding="utf-8"?>
+<file path=customXml/itemProps3.xml><?xml version="1.0" encoding="utf-8"?>
 <ds:datastoreItem xmlns:ds="http://schemas.openxmlformats.org/officeDocument/2006/customXml" ds:itemID="{78F40CB4-4884-4C8A-B77F-1211606006F9}">
   <ds:schemaRefs>
     <ds:schemaRef ds:uri="http://schemas.microsoft.com/office/2006/metadata/contentType"/>
@@ -18528,21 +18748,4 @@
     <ds:schemaRef ds:uri="http://schemas.microsoft.com/internal/obd"/>
   </ds:schemaRefs>
 </ds:datastoreItem>
-</file>
-
-<file path=customXml/itemProps2.xml><?xml version="1.0" encoding="utf-8"?>
-<ds:datastoreItem xmlns:ds="http://schemas.openxmlformats.org/officeDocument/2006/customXml" ds:itemID="{B0A916DD-11CA-458F-B8F7-4B7CD3BC2FF5}">
-  <ds:schemaRefs>
-    <ds:schemaRef ds:uri="http://schemas.microsoft.com/office/2006/metadata/properties"/>
-    <ds:schemaRef ds:uri="http://schemas.microsoft.com/office/infopath/2007/PartnerControls"/>
-  </ds:schemaRefs>
-</ds:datastoreItem>
-</file>
-
-<file path=customXml/itemProps3.xml><?xml version="1.0" encoding="utf-8"?>
-<ds:datastoreItem xmlns:ds="http://schemas.openxmlformats.org/officeDocument/2006/customXml" ds:itemID="{B1E2B90F-30CB-4456-9AFB-EEA28731CD54}">
-  <ds:schemaRefs>
-    <ds:schemaRef ds:uri="http://schemas.microsoft.com/sharepoint/v3/contenttype/forms"/>
-  </ds:schemaRefs>
-</ds:datastoreItem>
 </file>
</xml_diff>